<commit_message>
Presentation & ER Diagram update
</commit_message>
<xml_diff>
--- a/Airbnb.pptx
+++ b/Airbnb.pptx
@@ -24338,6 +24338,14 @@
 <file path=ppt/slides/slide10.xml><?xml version="1.0" encoding="utf-8"?>
 <p:sld xmlns:a="http://schemas.openxmlformats.org/drawingml/2006/main" xmlns:r="http://schemas.openxmlformats.org/officeDocument/2006/relationships" xmlns:p="http://schemas.openxmlformats.org/presentationml/2006/main">
   <p:cSld>
+    <p:bg>
+      <p:bgPr>
+        <a:solidFill>
+          <a:schemeClr val="bg1"/>
+        </a:solidFill>
+        <a:effectLst/>
+      </p:bgPr>
+    </p:bg>
     <p:spTree>
       <p:nvGrpSpPr>
         <p:cNvPr id="1" name=""/>
@@ -24352,9 +24360,138 @@
           <a:chExt cx="0" cy="0"/>
         </a:xfrm>
       </p:grpSpPr>
+      <p:sp>
+        <p:nvSpPr>
+          <p:cNvPr id="22" name="Rectangle 22">
+            <a:extLst>
+              <a:ext uri="{FF2B5EF4-FFF2-40B4-BE49-F238E27FC236}">
+                <a16:creationId xmlns:a16="http://schemas.microsoft.com/office/drawing/2014/main" id="{32BC26D8-82FB-445E-AA49-62A77D7C1EE0}"/>
+              </a:ext>
+              <a:ext uri="{C183D7F6-B498-43B3-948B-1728B52AA6E4}">
+                <adec:decorative xmlns:adec="http://schemas.microsoft.com/office/drawing/2017/decorative" val="1"/>
+              </a:ext>
+            </a:extLst>
+          </p:cNvPr>
+          <p:cNvSpPr>
+            <a:spLocks noGrp="1" noRot="1" noChangeAspect="1" noMove="1" noResize="1" noEditPoints="1" noAdjustHandles="1" noChangeArrowheads="1" noChangeShapeType="1" noTextEdit="1"/>
+          </p:cNvSpPr>
+          <p:nvPr>
+            <p:extLst>
+              <p:ext uri="{386F3935-93C4-4BCD-93E2-E3B085C9AB24}">
+                <p16:designElem xmlns:p16="http://schemas.microsoft.com/office/powerpoint/2015/main" val="1"/>
+              </p:ext>
+            </p:extLst>
+          </p:nvPr>
+        </p:nvSpPr>
+        <p:spPr>
+          <a:xfrm>
+            <a:off x="0" y="0"/>
+            <a:ext cx="12192000" cy="6858000"/>
+          </a:xfrm>
+          <a:prstGeom prst="rect">
+            <a:avLst/>
+          </a:prstGeom>
+          <a:solidFill>
+            <a:schemeClr val="tx1">
+              <a:lumMod val="65000"/>
+              <a:lumOff val="35000"/>
+            </a:schemeClr>
+          </a:solidFill>
+          <a:ln>
+            <a:noFill/>
+          </a:ln>
+        </p:spPr>
+        <p:style>
+          <a:lnRef idx="2">
+            <a:schemeClr val="accent1">
+              <a:shade val="50000"/>
+            </a:schemeClr>
+          </a:lnRef>
+          <a:fillRef idx="1">
+            <a:schemeClr val="accent1"/>
+          </a:fillRef>
+          <a:effectRef idx="0">
+            <a:schemeClr val="accent1"/>
+          </a:effectRef>
+          <a:fontRef idx="minor">
+            <a:schemeClr val="lt1"/>
+          </a:fontRef>
+        </p:style>
+        <p:txBody>
+          <a:bodyPr rtlCol="0" anchor="ctr"/>
+          <a:lstStyle/>
+          <a:p>
+            <a:pPr algn="ctr"/>
+            <a:endParaRPr lang="en-US"/>
+          </a:p>
+        </p:txBody>
+      </p:sp>
+      <p:sp>
+        <p:nvSpPr>
+          <p:cNvPr id="27" name="Rectangle 24">
+            <a:extLst>
+              <a:ext uri="{FF2B5EF4-FFF2-40B4-BE49-F238E27FC236}">
+                <a16:creationId xmlns:a16="http://schemas.microsoft.com/office/drawing/2014/main" id="{CB44330D-EA18-4254-AA95-EB49948539B8}"/>
+              </a:ext>
+              <a:ext uri="{C183D7F6-B498-43B3-948B-1728B52AA6E4}">
+                <adec:decorative xmlns:adec="http://schemas.microsoft.com/office/drawing/2017/decorative" val="1"/>
+              </a:ext>
+            </a:extLst>
+          </p:cNvPr>
+          <p:cNvSpPr>
+            <a:spLocks noGrp="1" noRot="1" noChangeAspect="1" noMove="1" noResize="1" noEditPoints="1" noAdjustHandles="1" noChangeArrowheads="1" noChangeShapeType="1" noTextEdit="1"/>
+          </p:cNvSpPr>
+          <p:nvPr>
+            <p:extLst>
+              <p:ext uri="{386F3935-93C4-4BCD-93E2-E3B085C9AB24}">
+                <p16:designElem xmlns:p16="http://schemas.microsoft.com/office/powerpoint/2015/main" val="1"/>
+              </p:ext>
+            </p:extLst>
+          </p:nvPr>
+        </p:nvSpPr>
+        <p:spPr>
+          <a:xfrm>
+            <a:off x="477012" y="480060"/>
+            <a:ext cx="11237976" cy="5897880"/>
+          </a:xfrm>
+          <a:prstGeom prst="rect">
+            <a:avLst/>
+          </a:prstGeom>
+          <a:solidFill>
+            <a:srgbClr val="FFFFFF"/>
+          </a:solidFill>
+          <a:ln>
+            <a:noFill/>
+          </a:ln>
+        </p:spPr>
+        <p:style>
+          <a:lnRef idx="2">
+            <a:schemeClr val="accent1">
+              <a:shade val="50000"/>
+            </a:schemeClr>
+          </a:lnRef>
+          <a:fillRef idx="1">
+            <a:schemeClr val="accent1"/>
+          </a:fillRef>
+          <a:effectRef idx="0">
+            <a:schemeClr val="accent1"/>
+          </a:effectRef>
+          <a:fontRef idx="minor">
+            <a:schemeClr val="lt1"/>
+          </a:fontRef>
+        </p:style>
+        <p:txBody>
+          <a:bodyPr rtlCol="0" anchor="ctr"/>
+          <a:lstStyle/>
+          <a:p>
+            <a:pPr algn="ctr"/>
+            <a:endParaRPr lang="en-US"/>
+          </a:p>
+        </p:txBody>
+      </p:sp>
       <p:pic>
         <p:nvPicPr>
-          <p:cNvPr id="6" name="Picture 5">
+          <p:cNvPr id="6" name="Picture 5" descr="Graphical user interface, text, application&#10;&#10;Description automatically generated">
             <a:extLst>
               <a:ext uri="{FF2B5EF4-FFF2-40B4-BE49-F238E27FC236}">
                 <a16:creationId xmlns:a16="http://schemas.microsoft.com/office/drawing/2014/main" id="{2879E55C-1791-4EB7-AD79-7F6D8A525303}"/>
@@ -24368,20 +24505,17 @@
         </p:nvPicPr>
         <p:blipFill rotWithShape="1">
           <a:blip r:embed="rId2"/>
-          <a:srcRect l="2087" r="9149"/>
+          <a:srcRect l="3065" t="669" r="11516" b="2674"/>
           <a:stretch/>
         </p:blipFill>
         <p:spPr>
           <a:xfrm>
-            <a:off x="0" y="172700"/>
-            <a:ext cx="6594548" cy="6366212"/>
+            <a:off x="551094" y="847218"/>
+            <a:ext cx="5852004" cy="5115296"/>
           </a:xfrm>
           <a:prstGeom prst="rect">
             <a:avLst/>
           </a:prstGeom>
-          <a:ln>
-            <a:noFill/>
-          </a:ln>
         </p:spPr>
       </p:pic>
       <p:sp>
@@ -24402,12 +24536,12 @@
         </p:nvSpPr>
         <p:spPr>
           <a:xfrm>
-            <a:off x="8805333" y="6356350"/>
+            <a:off x="8610600" y="6356350"/>
             <a:ext cx="2743200" cy="365125"/>
           </a:xfrm>
         </p:spPr>
         <p:txBody>
-          <a:bodyPr vert="horz" lIns="91440" tIns="45720" rIns="91440" bIns="45720" rtlCol="0" anchor="ctr">
+          <a:bodyPr vert="horz" lIns="91440" tIns="45720" rIns="91440" bIns="45720" rtlCol="0">
             <a:normAutofit/>
           </a:bodyPr>
           <a:lstStyle/>
@@ -24418,7 +24552,11 @@
               </a:spcAft>
             </a:pPr>
             <a:fld id="{D495E168-DA5E-4888-8D8A-92B118324C14}" type="slidenum">
-              <a:rPr lang="en-US" smtClean="0"/>
+              <a:rPr lang="en-US">
+                <a:solidFill>
+                  <a:srgbClr val="FFFFFF"/>
+                </a:solidFill>
+              </a:rPr>
               <a:pPr>
                 <a:spcAft>
                   <a:spcPts val="600"/>
@@ -24426,223 +24564,17 @@
               </a:pPr>
               <a:t>10</a:t>
             </a:fld>
-            <a:endParaRPr lang="en-US"/>
+            <a:endParaRPr lang="en-US">
+              <a:solidFill>
+                <a:srgbClr val="FFFFFF"/>
+              </a:solidFill>
+            </a:endParaRPr>
           </a:p>
         </p:txBody>
       </p:sp>
       <p:pic>
         <p:nvPicPr>
-          <p:cNvPr id="8" name="Picture 7">
-            <a:extLst>
-              <a:ext uri="{FF2B5EF4-FFF2-40B4-BE49-F238E27FC236}">
-                <a16:creationId xmlns:a16="http://schemas.microsoft.com/office/drawing/2014/main" id="{0428FBCB-6D74-4212-9075-56318F3BB615}"/>
-              </a:ext>
-            </a:extLst>
-          </p:cNvPr>
-          <p:cNvPicPr>
-            <a:picLocks noChangeAspect="1"/>
-          </p:cNvPicPr>
-          <p:nvPr/>
-        </p:nvPicPr>
-        <p:blipFill>
-          <a:blip r:embed="rId3"/>
-          <a:stretch>
-            <a:fillRect/>
-          </a:stretch>
-        </p:blipFill>
-        <p:spPr>
-          <a:xfrm>
-            <a:off x="6497069" y="429208"/>
-            <a:ext cx="3279950" cy="1304926"/>
-          </a:xfrm>
-          <a:prstGeom prst="rect">
-            <a:avLst/>
-          </a:prstGeom>
-        </p:spPr>
-      </p:pic>
-      <p:pic>
-        <p:nvPicPr>
-          <p:cNvPr id="10" name="Picture 9">
-            <a:extLst>
-              <a:ext uri="{FF2B5EF4-FFF2-40B4-BE49-F238E27FC236}">
-                <a16:creationId xmlns:a16="http://schemas.microsoft.com/office/drawing/2014/main" id="{1CDB431E-B065-4D1B-8509-40ED1EC38B88}"/>
-              </a:ext>
-            </a:extLst>
-          </p:cNvPr>
-          <p:cNvPicPr>
-            <a:picLocks noChangeAspect="1"/>
-          </p:cNvPicPr>
-          <p:nvPr/>
-        </p:nvPicPr>
-        <p:blipFill>
-          <a:blip r:embed="rId4"/>
-          <a:stretch>
-            <a:fillRect/>
-          </a:stretch>
-        </p:blipFill>
-        <p:spPr>
-          <a:xfrm>
-            <a:off x="3468780" y="623707"/>
-            <a:ext cx="2906261" cy="954611"/>
-          </a:xfrm>
-          <a:prstGeom prst="rect">
-            <a:avLst/>
-          </a:prstGeom>
-        </p:spPr>
-      </p:pic>
-      <p:pic>
-        <p:nvPicPr>
-          <p:cNvPr id="16" name="Picture 15">
-            <a:extLst>
-              <a:ext uri="{FF2B5EF4-FFF2-40B4-BE49-F238E27FC236}">
-                <a16:creationId xmlns:a16="http://schemas.microsoft.com/office/drawing/2014/main" id="{82351C53-8CB4-43DE-945A-8D33343C2821}"/>
-              </a:ext>
-            </a:extLst>
-          </p:cNvPr>
-          <p:cNvPicPr>
-            <a:picLocks noChangeAspect="1"/>
-          </p:cNvPicPr>
-          <p:nvPr/>
-        </p:nvPicPr>
-        <p:blipFill>
-          <a:blip r:embed="rId5"/>
-          <a:stretch>
-            <a:fillRect/>
-          </a:stretch>
-        </p:blipFill>
-        <p:spPr>
-          <a:xfrm>
-            <a:off x="9786126" y="0"/>
-            <a:ext cx="2405874" cy="4942236"/>
-          </a:xfrm>
-          <a:prstGeom prst="rect">
-            <a:avLst/>
-          </a:prstGeom>
-        </p:spPr>
-      </p:pic>
-      <p:pic>
-        <p:nvPicPr>
-          <p:cNvPr id="20" name="Picture 19">
-            <a:extLst>
-              <a:ext uri="{FF2B5EF4-FFF2-40B4-BE49-F238E27FC236}">
-                <a16:creationId xmlns:a16="http://schemas.microsoft.com/office/drawing/2014/main" id="{47290817-0FEF-4020-BD42-4A0BF3A0D2D2}"/>
-              </a:ext>
-            </a:extLst>
-          </p:cNvPr>
-          <p:cNvPicPr>
-            <a:picLocks noChangeAspect="1"/>
-          </p:cNvPicPr>
-          <p:nvPr/>
-        </p:nvPicPr>
-        <p:blipFill>
-          <a:blip r:embed="rId6"/>
-          <a:stretch>
-            <a:fillRect/>
-          </a:stretch>
-        </p:blipFill>
-        <p:spPr>
-          <a:xfrm>
-            <a:off x="8246450" y="1906236"/>
-            <a:ext cx="1656840" cy="2453570"/>
-          </a:xfrm>
-          <a:prstGeom prst="rect">
-            <a:avLst/>
-          </a:prstGeom>
-        </p:spPr>
-      </p:pic>
-      <p:pic>
-        <p:nvPicPr>
-          <p:cNvPr id="24" name="Picture 23">
-            <a:extLst>
-              <a:ext uri="{FF2B5EF4-FFF2-40B4-BE49-F238E27FC236}">
-                <a16:creationId xmlns:a16="http://schemas.microsoft.com/office/drawing/2014/main" id="{69E91F8C-94E7-4961-A766-0EB4D425606A}"/>
-              </a:ext>
-            </a:extLst>
-          </p:cNvPr>
-          <p:cNvPicPr>
-            <a:picLocks noChangeAspect="1"/>
-          </p:cNvPicPr>
-          <p:nvPr/>
-        </p:nvPicPr>
-        <p:blipFill>
-          <a:blip r:embed="rId7"/>
-          <a:stretch>
-            <a:fillRect/>
-          </a:stretch>
-        </p:blipFill>
-        <p:spPr>
-          <a:xfrm>
-            <a:off x="5358865" y="2234936"/>
-            <a:ext cx="2281587" cy="1711191"/>
-          </a:xfrm>
-          <a:prstGeom prst="rect">
-            <a:avLst/>
-          </a:prstGeom>
-        </p:spPr>
-      </p:pic>
-      <p:pic>
-        <p:nvPicPr>
-          <p:cNvPr id="31" name="Picture 30">
-            <a:extLst>
-              <a:ext uri="{FF2B5EF4-FFF2-40B4-BE49-F238E27FC236}">
-                <a16:creationId xmlns:a16="http://schemas.microsoft.com/office/drawing/2014/main" id="{32F7E301-B411-488D-A3E0-4D1386DADFAC}"/>
-              </a:ext>
-            </a:extLst>
-          </p:cNvPr>
-          <p:cNvPicPr>
-            <a:picLocks noChangeAspect="1"/>
-          </p:cNvPicPr>
-          <p:nvPr/>
-        </p:nvPicPr>
-        <p:blipFill>
-          <a:blip r:embed="rId8"/>
-          <a:stretch>
-            <a:fillRect/>
-          </a:stretch>
-        </p:blipFill>
-        <p:spPr>
-          <a:xfrm>
-            <a:off x="4853139" y="4359806"/>
-            <a:ext cx="2479764" cy="1397181"/>
-          </a:xfrm>
-          <a:prstGeom prst="rect">
-            <a:avLst/>
-          </a:prstGeom>
-        </p:spPr>
-      </p:pic>
-      <p:pic>
-        <p:nvPicPr>
-          <p:cNvPr id="33" name="Picture 32">
-            <a:extLst>
-              <a:ext uri="{FF2B5EF4-FFF2-40B4-BE49-F238E27FC236}">
-                <a16:creationId xmlns:a16="http://schemas.microsoft.com/office/drawing/2014/main" id="{69C13909-BB6F-4BC0-A024-CC71E9041A7C}"/>
-              </a:ext>
-            </a:extLst>
-          </p:cNvPr>
-          <p:cNvPicPr>
-            <a:picLocks noChangeAspect="1"/>
-          </p:cNvPicPr>
-          <p:nvPr/>
-        </p:nvPicPr>
-        <p:blipFill>
-          <a:blip r:embed="rId9"/>
-          <a:stretch>
-            <a:fillRect/>
-          </a:stretch>
-        </p:blipFill>
-        <p:spPr>
-          <a:xfrm>
-            <a:off x="7642647" y="4942236"/>
-            <a:ext cx="3137116" cy="625373"/>
-          </a:xfrm>
-          <a:prstGeom prst="rect">
-            <a:avLst/>
-          </a:prstGeom>
-        </p:spPr>
-      </p:pic>
-      <p:pic>
-        <p:nvPicPr>
-          <p:cNvPr id="18" name="Picture 17">
+          <p:cNvPr id="18" name="Picture 17" descr="Company name&#10;&#10;Description automatically generated">
             <a:extLst>
               <a:ext uri="{FF2B5EF4-FFF2-40B4-BE49-F238E27FC236}">
                 <a16:creationId xmlns:a16="http://schemas.microsoft.com/office/drawing/2014/main" id="{D208060D-EE96-490E-A053-4EDF78A0B870}"/>
@@ -24655,7 +24587,7 @@
           <p:nvPr/>
         </p:nvPicPr>
         <p:blipFill>
-          <a:blip r:embed="rId10"/>
+          <a:blip r:embed="rId3"/>
           <a:stretch>
             <a:fillRect/>
           </a:stretch>
@@ -24690,6 +24622,216 @@
               <a:srgbClr val="333333"/>
             </a:contourClr>
           </a:sp3d>
+        </p:spPr>
+      </p:pic>
+      <p:pic>
+        <p:nvPicPr>
+          <p:cNvPr id="3" name="Picture 2">
+            <a:extLst>
+              <a:ext uri="{FF2B5EF4-FFF2-40B4-BE49-F238E27FC236}">
+                <a16:creationId xmlns:a16="http://schemas.microsoft.com/office/drawing/2014/main" id="{89DB5EED-8D26-4639-84C0-796E7D821B9B}"/>
+              </a:ext>
+            </a:extLst>
+          </p:cNvPr>
+          <p:cNvPicPr>
+            <a:picLocks noChangeAspect="1"/>
+          </p:cNvPicPr>
+          <p:nvPr/>
+        </p:nvPicPr>
+        <p:blipFill>
+          <a:blip r:embed="rId4"/>
+          <a:stretch>
+            <a:fillRect/>
+          </a:stretch>
+        </p:blipFill>
+        <p:spPr>
+          <a:xfrm>
+            <a:off x="5151697" y="792450"/>
+            <a:ext cx="2254366" cy="1168460"/>
+          </a:xfrm>
+          <a:prstGeom prst="rect">
+            <a:avLst/>
+          </a:prstGeom>
+        </p:spPr>
+      </p:pic>
+      <p:pic>
+        <p:nvPicPr>
+          <p:cNvPr id="7" name="Picture 6">
+            <a:extLst>
+              <a:ext uri="{FF2B5EF4-FFF2-40B4-BE49-F238E27FC236}">
+                <a16:creationId xmlns:a16="http://schemas.microsoft.com/office/drawing/2014/main" id="{2ACE2AC8-A1D4-4FFE-A85A-0EBFFF573BFF}"/>
+              </a:ext>
+            </a:extLst>
+          </p:cNvPr>
+          <p:cNvPicPr>
+            <a:picLocks noChangeAspect="1"/>
+          </p:cNvPicPr>
+          <p:nvPr/>
+        </p:nvPicPr>
+        <p:blipFill>
+          <a:blip r:embed="rId5"/>
+          <a:stretch>
+            <a:fillRect/>
+          </a:stretch>
+        </p:blipFill>
+        <p:spPr>
+          <a:xfrm>
+            <a:off x="7674478" y="759495"/>
+            <a:ext cx="1886047" cy="749339"/>
+          </a:xfrm>
+          <a:prstGeom prst="rect">
+            <a:avLst/>
+          </a:prstGeom>
+        </p:spPr>
+      </p:pic>
+      <p:pic>
+        <p:nvPicPr>
+          <p:cNvPr id="11" name="Picture 10">
+            <a:extLst>
+              <a:ext uri="{FF2B5EF4-FFF2-40B4-BE49-F238E27FC236}">
+                <a16:creationId xmlns:a16="http://schemas.microsoft.com/office/drawing/2014/main" id="{EE48E1F6-5871-43EA-811C-FA8F4DD8520E}"/>
+              </a:ext>
+            </a:extLst>
+          </p:cNvPr>
+          <p:cNvPicPr>
+            <a:picLocks noChangeAspect="1"/>
+          </p:cNvPicPr>
+          <p:nvPr/>
+        </p:nvPicPr>
+        <p:blipFill>
+          <a:blip r:embed="rId6"/>
+          <a:stretch>
+            <a:fillRect/>
+          </a:stretch>
+        </p:blipFill>
+        <p:spPr>
+          <a:xfrm>
+            <a:off x="9346822" y="1567980"/>
+            <a:ext cx="2114659" cy="3988005"/>
+          </a:xfrm>
+          <a:prstGeom prst="rect">
+            <a:avLst/>
+          </a:prstGeom>
+        </p:spPr>
+      </p:pic>
+      <p:pic>
+        <p:nvPicPr>
+          <p:cNvPr id="13" name="Picture 12">
+            <a:extLst>
+              <a:ext uri="{FF2B5EF4-FFF2-40B4-BE49-F238E27FC236}">
+                <a16:creationId xmlns:a16="http://schemas.microsoft.com/office/drawing/2014/main" id="{151E6FF5-3131-4C88-9E54-21E70C810450}"/>
+              </a:ext>
+            </a:extLst>
+          </p:cNvPr>
+          <p:cNvPicPr>
+            <a:picLocks noChangeAspect="1"/>
+          </p:cNvPicPr>
+          <p:nvPr/>
+        </p:nvPicPr>
+        <p:blipFill>
+          <a:blip r:embed="rId7"/>
+          <a:stretch>
+            <a:fillRect/>
+          </a:stretch>
+        </p:blipFill>
+        <p:spPr>
+          <a:xfrm>
+            <a:off x="5387938" y="2482801"/>
+            <a:ext cx="1416123" cy="1892397"/>
+          </a:xfrm>
+          <a:prstGeom prst="rect">
+            <a:avLst/>
+          </a:prstGeom>
+        </p:spPr>
+      </p:pic>
+      <p:pic>
+        <p:nvPicPr>
+          <p:cNvPr id="15" name="Picture 14">
+            <a:extLst>
+              <a:ext uri="{FF2B5EF4-FFF2-40B4-BE49-F238E27FC236}">
+                <a16:creationId xmlns:a16="http://schemas.microsoft.com/office/drawing/2014/main" id="{1216F1E5-23C6-4C98-8A6A-0C9789D8A7EB}"/>
+              </a:ext>
+            </a:extLst>
+          </p:cNvPr>
+          <p:cNvPicPr>
+            <a:picLocks noChangeAspect="1"/>
+          </p:cNvPicPr>
+          <p:nvPr/>
+        </p:nvPicPr>
+        <p:blipFill>
+          <a:blip r:embed="rId8"/>
+          <a:stretch>
+            <a:fillRect/>
+          </a:stretch>
+        </p:blipFill>
+        <p:spPr>
+          <a:xfrm>
+            <a:off x="7430244" y="4027211"/>
+            <a:ext cx="1892397" cy="1543129"/>
+          </a:xfrm>
+          <a:prstGeom prst="rect">
+            <a:avLst/>
+          </a:prstGeom>
+        </p:spPr>
+      </p:pic>
+      <p:pic>
+        <p:nvPicPr>
+          <p:cNvPr id="19" name="Picture 18">
+            <a:extLst>
+              <a:ext uri="{FF2B5EF4-FFF2-40B4-BE49-F238E27FC236}">
+                <a16:creationId xmlns:a16="http://schemas.microsoft.com/office/drawing/2014/main" id="{5D717792-1D61-47B5-A1CE-219D21E7A71F}"/>
+              </a:ext>
+            </a:extLst>
+          </p:cNvPr>
+          <p:cNvPicPr>
+            <a:picLocks noChangeAspect="1"/>
+          </p:cNvPicPr>
+          <p:nvPr/>
+        </p:nvPicPr>
+        <p:blipFill>
+          <a:blip r:embed="rId9"/>
+          <a:stretch>
+            <a:fillRect/>
+          </a:stretch>
+        </p:blipFill>
+        <p:spPr>
+          <a:xfrm>
+            <a:off x="7306876" y="2440970"/>
+            <a:ext cx="1663786" cy="1168460"/>
+          </a:xfrm>
+          <a:prstGeom prst="rect">
+            <a:avLst/>
+          </a:prstGeom>
+        </p:spPr>
+      </p:pic>
+      <p:pic>
+        <p:nvPicPr>
+          <p:cNvPr id="23" name="Picture 22">
+            <a:extLst>
+              <a:ext uri="{FF2B5EF4-FFF2-40B4-BE49-F238E27FC236}">
+                <a16:creationId xmlns:a16="http://schemas.microsoft.com/office/drawing/2014/main" id="{0A3D4E80-BD8D-4023-B8B1-9BE697F58653}"/>
+              </a:ext>
+            </a:extLst>
+          </p:cNvPr>
+          <p:cNvPicPr>
+            <a:picLocks noChangeAspect="1"/>
+          </p:cNvPicPr>
+          <p:nvPr/>
+        </p:nvPicPr>
+        <p:blipFill>
+          <a:blip r:embed="rId10"/>
+          <a:stretch>
+            <a:fillRect/>
+          </a:stretch>
+        </p:blipFill>
+        <p:spPr>
+          <a:xfrm>
+            <a:off x="5493587" y="4917455"/>
+            <a:ext cx="1587582" cy="406421"/>
+          </a:xfrm>
+          <a:prstGeom prst="rect">
+            <a:avLst/>
+          </a:prstGeom>
         </p:spPr>
       </p:pic>
     </p:spTree>
@@ -24796,8 +24938,8 @@
         </p:nvSpPr>
         <p:spPr>
           <a:xfrm>
-            <a:off x="956077" y="2466079"/>
-            <a:ext cx="7299960" cy="2554545"/>
+            <a:off x="956076" y="2466079"/>
+            <a:ext cx="10397724" cy="1169551"/>
           </a:xfrm>
           <a:prstGeom prst="rect">
             <a:avLst/>
@@ -24811,10 +24953,10 @@
           <a:lstStyle/>
           <a:p>
             <a:r>
-              <a:rPr lang="en-US" sz="8000" dirty="0"/>
+              <a:rPr lang="en-US" sz="7000" dirty="0"/>
               <a:t>Time to see our Demo! </a:t>
             </a:r>
-            <a:endParaRPr lang="bg-BG" sz="8000" dirty="0"/>
+            <a:endParaRPr lang="bg-BG" sz="7000" dirty="0"/>
           </a:p>
         </p:txBody>
       </p:sp>
@@ -25220,7 +25362,7 @@
         <p:spPr>
           <a:xfrm>
             <a:off x="1430969" y="5150047"/>
-            <a:ext cx="4103621" cy="1477328"/>
+            <a:ext cx="4103621" cy="1569660"/>
           </a:xfrm>
           <a:prstGeom prst="rect">
             <a:avLst/>
@@ -25234,11 +25376,11 @@
           <a:lstStyle/>
           <a:p>
             <a:r>
-              <a:rPr lang="bg-BG" dirty="0" err="1"/>
+              <a:rPr lang="bg-BG" sz="2200" i="1" dirty="0" err="1"/>
               <a:t>Цветислава</a:t>
             </a:r>
             <a:r>
-              <a:rPr lang="bg-BG" dirty="0"/>
+              <a:rPr lang="bg-BG" sz="2200" i="1" dirty="0"/>
               <a:t> Янкова</a:t>
             </a:r>
           </a:p>
@@ -25257,15 +25399,7 @@
             </a:r>
             <a:r>
               <a:rPr lang="ru-RU" dirty="0"/>
-              <a:t> </a:t>
-            </a:r>
-            <a:r>
-              <a:rPr lang="ru-RU" dirty="0" err="1"/>
-              <a:t>програма</a:t>
-            </a:r>
-            <a:r>
-              <a:rPr lang="ru-RU" dirty="0"/>
-              <a:t> Бизнес информатика в УНСС</a:t>
+              <a:t> програма Бизнес информатика, УНСС</a:t>
             </a:r>
           </a:p>
           <a:p>
@@ -25283,31 +25417,7 @@
             </a:r>
             <a:r>
               <a:rPr lang="ru-RU" dirty="0"/>
-              <a:t> опит </a:t>
-            </a:r>
-            <a:r>
-              <a:rPr lang="ru-RU" dirty="0" err="1"/>
-              <a:t>като</a:t>
-            </a:r>
-            <a:r>
-              <a:rPr lang="ru-RU" dirty="0"/>
-              <a:t> </a:t>
-            </a:r>
-            <a:r>
-              <a:rPr lang="ru-RU" dirty="0" err="1"/>
-              <a:t>Audit</a:t>
-            </a:r>
-            <a:r>
-              <a:rPr lang="ru-RU" dirty="0"/>
-              <a:t> </a:t>
-            </a:r>
-            <a:r>
-              <a:rPr lang="ru-RU" dirty="0" err="1"/>
-              <a:t>Analyst</a:t>
-            </a:r>
-            <a:r>
-              <a:rPr lang="ru-RU" dirty="0"/>
-              <a:t>(</a:t>
+              <a:t> опит като </a:t>
             </a:r>
             <a:r>
               <a:rPr lang="ru-RU" dirty="0" err="1"/>
@@ -25315,7 +25425,7 @@
             </a:r>
             <a:r>
               <a:rPr lang="ru-RU" dirty="0"/>
-              <a:t> анализатор) в BIG4</a:t>
+              <a:t> анализатор в BIG4 компания</a:t>
             </a:r>
             <a:endParaRPr lang="en-US" dirty="0"/>
           </a:p>
@@ -25336,7 +25446,7 @@
         <p:spPr>
           <a:xfrm>
             <a:off x="6722725" y="5288547"/>
-            <a:ext cx="3764289" cy="1200329"/>
+            <a:ext cx="3764289" cy="1292662"/>
           </a:xfrm>
           <a:prstGeom prst="rect">
             <a:avLst/>
@@ -25350,7 +25460,7 @@
           <a:lstStyle/>
           <a:p>
             <a:r>
-              <a:rPr lang="bg-BG" dirty="0"/>
+              <a:rPr lang="bg-BG" sz="2200" i="1" dirty="0"/>
               <a:t>Ния Попова</a:t>
             </a:r>
           </a:p>
@@ -25496,15 +25606,6 @@
               <a:srgbClr val="FFFFFF"/>
             </a:contourClr>
           </a:sp3d>
-          <a:extLst>
-            <a:ext uri="{909E8E84-426E-40DD-AFC4-6F175D3DCCD1}">
-              <a14:hiddenFill xmlns:a14="http://schemas.microsoft.com/office/drawing/2010/main">
-                <a:solidFill>
-                  <a:srgbClr val="FFFFFF"/>
-                </a:solidFill>
-              </a14:hiddenFill>
-            </a:ext>
-          </a:extLst>
         </p:spPr>
       </p:pic>
     </p:spTree>
@@ -25580,8 +25681,8 @@
         </p:nvSpPr>
         <p:spPr>
           <a:xfrm>
-            <a:off x="769569" y="961053"/>
-            <a:ext cx="7729064" cy="553998"/>
+            <a:off x="637489" y="935674"/>
+            <a:ext cx="8465872" cy="4401205"/>
           </a:xfrm>
           <a:prstGeom prst="rect">
             <a:avLst/>
@@ -25595,10 +25696,231 @@
           <a:lstStyle/>
           <a:p>
             <a:r>
-              <a:rPr lang="en-US" sz="3000" dirty="0"/>
-              <a:t>Airbnb stands for Air Bed and Breakfast</a:t>
+              <a:rPr lang="en-US" sz="2800" dirty="0"/>
+              <a:t>	</a:t>
             </a:r>
-            <a:endParaRPr lang="bg-BG" sz="3000" dirty="0"/>
+            <a:r>
+              <a:rPr lang="ru-RU" sz="2800" dirty="0" err="1"/>
+              <a:t>Airbnb</a:t>
+            </a:r>
+            <a:r>
+              <a:rPr lang="ru-RU" sz="2800" dirty="0"/>
+              <a:t> е онлайн платформа, която предлага </a:t>
+            </a:r>
+            <a:r>
+              <a:rPr lang="ru-RU" sz="2800" dirty="0" err="1"/>
+              <a:t>обяви</a:t>
+            </a:r>
+            <a:r>
+              <a:rPr lang="ru-RU" sz="2800" dirty="0"/>
+              <a:t> за краткосрочно </a:t>
+            </a:r>
+            <a:r>
+              <a:rPr lang="ru-RU" sz="2800" dirty="0" err="1"/>
+              <a:t>наемане</a:t>
+            </a:r>
+            <a:r>
+              <a:rPr lang="ru-RU" sz="2800" dirty="0"/>
+              <a:t> на жилища по </a:t>
+            </a:r>
+            <a:r>
+              <a:rPr lang="ru-RU" sz="2800" dirty="0" err="1"/>
+              <a:t>цял</a:t>
+            </a:r>
+            <a:r>
+              <a:rPr lang="ru-RU" sz="2800" dirty="0"/>
+              <a:t> свят. </a:t>
+            </a:r>
+            <a:r>
+              <a:rPr lang="ru-RU" sz="2800" dirty="0" err="1"/>
+              <a:t>Всеки</a:t>
+            </a:r>
+            <a:r>
+              <a:rPr lang="ru-RU" sz="2800" dirty="0"/>
+              <a:t> може да </a:t>
+            </a:r>
+            <a:r>
+              <a:rPr lang="ru-RU" sz="2800" dirty="0" err="1"/>
+              <a:t>пусне</a:t>
+            </a:r>
+            <a:r>
+              <a:rPr lang="ru-RU" sz="2800" dirty="0"/>
+              <a:t> </a:t>
+            </a:r>
+            <a:r>
+              <a:rPr lang="ru-RU" sz="2800" dirty="0" err="1"/>
+              <a:t>обява</a:t>
+            </a:r>
+            <a:r>
+              <a:rPr lang="ru-RU" sz="2800" dirty="0"/>
+              <a:t> за стая, апартамент, вила или </a:t>
+            </a:r>
+            <a:r>
+              <a:rPr lang="ru-RU" sz="2800" dirty="0" err="1"/>
+              <a:t>цяла</a:t>
+            </a:r>
+            <a:r>
+              <a:rPr lang="ru-RU" sz="2800" dirty="0"/>
+              <a:t> </a:t>
+            </a:r>
+            <a:r>
+              <a:rPr lang="ru-RU" sz="2800" dirty="0" err="1"/>
+              <a:t>къща</a:t>
+            </a:r>
+            <a:r>
+              <a:rPr lang="en-US" sz="2800" dirty="0"/>
+              <a:t>. </a:t>
+            </a:r>
+            <a:r>
+              <a:rPr lang="bg-BG" sz="2800" dirty="0"/>
+              <a:t>Р</a:t>
+            </a:r>
+            <a:r>
+              <a:rPr lang="ru-RU" sz="2800" dirty="0" err="1"/>
+              <a:t>олята</a:t>
+            </a:r>
+            <a:r>
+              <a:rPr lang="ru-RU" sz="2800" dirty="0"/>
+              <a:t> на </a:t>
+            </a:r>
+            <a:r>
+              <a:rPr lang="ru-RU" sz="2800" dirty="0" err="1"/>
+              <a:t>платформата</a:t>
+            </a:r>
+            <a:r>
+              <a:rPr lang="ru-RU" sz="2800" dirty="0"/>
+              <a:t> е да </a:t>
+            </a:r>
+            <a:r>
+              <a:rPr lang="ru-RU" sz="2800" dirty="0" err="1"/>
+              <a:t>свързва</a:t>
+            </a:r>
+            <a:r>
+              <a:rPr lang="ru-RU" sz="2800" dirty="0"/>
+              <a:t> </a:t>
+            </a:r>
+            <a:r>
+              <a:rPr lang="ru-RU" sz="2800" dirty="0" err="1"/>
+              <a:t>собствениците</a:t>
+            </a:r>
+            <a:r>
+              <a:rPr lang="ru-RU" sz="2800" dirty="0"/>
+              <a:t> и гостите, да предлага </a:t>
+            </a:r>
+            <a:r>
+              <a:rPr lang="ru-RU" sz="2800" dirty="0" err="1"/>
+              <a:t>необходимата</a:t>
+            </a:r>
+            <a:r>
+              <a:rPr lang="ru-RU" sz="2800" dirty="0"/>
+              <a:t> информация и да </a:t>
+            </a:r>
+            <a:r>
+              <a:rPr lang="ru-RU" sz="2800" dirty="0" err="1"/>
+              <a:t>осигурява</a:t>
+            </a:r>
+            <a:r>
+              <a:rPr lang="ru-RU" sz="2800" dirty="0"/>
+              <a:t> </a:t>
+            </a:r>
+            <a:r>
+              <a:rPr lang="ru-RU" sz="2800" dirty="0" err="1"/>
+              <a:t>обработването</a:t>
+            </a:r>
+            <a:r>
+              <a:rPr lang="ru-RU" sz="2800" dirty="0"/>
+              <a:t> на </a:t>
+            </a:r>
+            <a:r>
+              <a:rPr lang="ru-RU" sz="2800" dirty="0" err="1"/>
+              <a:t>плащането</a:t>
+            </a:r>
+            <a:r>
+              <a:rPr lang="ru-RU" sz="2800" dirty="0"/>
+              <a:t> за </a:t>
+            </a:r>
+            <a:r>
+              <a:rPr lang="ru-RU" sz="2800" dirty="0" err="1"/>
+              <a:t>престоя</a:t>
+            </a:r>
+            <a:r>
+              <a:rPr lang="ru-RU" sz="2800" dirty="0"/>
+              <a:t>.</a:t>
+            </a:r>
+          </a:p>
+          <a:p>
+            <a:endParaRPr lang="ru-RU" sz="2800" dirty="0"/>
+          </a:p>
+          <a:p>
+            <a:r>
+              <a:rPr lang="en-US" sz="2800" dirty="0"/>
+              <a:t>	</a:t>
+            </a:r>
+            <a:r>
+              <a:rPr lang="ru-RU" sz="2800" dirty="0" err="1"/>
+              <a:t>Airbnb</a:t>
+            </a:r>
+            <a:r>
+              <a:rPr lang="ru-RU" sz="2800" dirty="0"/>
+              <a:t> е </a:t>
+            </a:r>
+            <a:r>
+              <a:rPr lang="ru-RU" sz="2800" dirty="0" err="1"/>
+              <a:t>съкращение</a:t>
+            </a:r>
+            <a:r>
+              <a:rPr lang="ru-RU" sz="2800" dirty="0"/>
+              <a:t> от Air </a:t>
+            </a:r>
+            <a:r>
+              <a:rPr lang="ru-RU" sz="2800" dirty="0" err="1"/>
+              <a:t>mattress</a:t>
+            </a:r>
+            <a:r>
+              <a:rPr lang="ru-RU" sz="2800" dirty="0"/>
+              <a:t>, </a:t>
+            </a:r>
+            <a:r>
+              <a:rPr lang="ru-RU" sz="2800" dirty="0" err="1"/>
+              <a:t>bed</a:t>
+            </a:r>
+            <a:r>
+              <a:rPr lang="ru-RU" sz="2800" dirty="0"/>
+              <a:t> </a:t>
+            </a:r>
+            <a:r>
+              <a:rPr lang="ru-RU" sz="2800" dirty="0" err="1"/>
+              <a:t>and</a:t>
+            </a:r>
+            <a:r>
+              <a:rPr lang="ru-RU" sz="2800" dirty="0"/>
+              <a:t> </a:t>
+            </a:r>
+            <a:r>
+              <a:rPr lang="ru-RU" sz="2800" dirty="0" err="1"/>
+              <a:t>breakfast</a:t>
+            </a:r>
+            <a:r>
+              <a:rPr lang="ru-RU" sz="2800" dirty="0"/>
+              <a:t>, т.е. надуваем </a:t>
+            </a:r>
+            <a:r>
+              <a:rPr lang="ru-RU" sz="2800" dirty="0" err="1"/>
+              <a:t>дюшек</a:t>
+            </a:r>
+            <a:r>
+              <a:rPr lang="ru-RU" sz="2800" dirty="0"/>
+              <a:t>, </a:t>
+            </a:r>
+            <a:r>
+              <a:rPr lang="ru-RU" sz="2800" dirty="0" err="1"/>
+              <a:t>нощувка</a:t>
+            </a:r>
+            <a:r>
+              <a:rPr lang="ru-RU" sz="2800" dirty="0"/>
+              <a:t> и закуска. </a:t>
+            </a:r>
+            <a:endParaRPr lang="bg-BG" sz="2800" dirty="0"/>
           </a:p>
         </p:txBody>
       </p:sp>
@@ -25654,6 +25976,98 @@
           </a:sp3d>
         </p:spPr>
       </p:pic>
+      <p:sp>
+        <p:nvSpPr>
+          <p:cNvPr id="2" name="Arrow: Right 1">
+            <a:extLst>
+              <a:ext uri="{FF2B5EF4-FFF2-40B4-BE49-F238E27FC236}">
+                <a16:creationId xmlns:a16="http://schemas.microsoft.com/office/drawing/2014/main" id="{D25E3900-6F84-49C0-A607-D6F71A938B17}"/>
+              </a:ext>
+            </a:extLst>
+          </p:cNvPr>
+          <p:cNvSpPr/>
+          <p:nvPr/>
+        </p:nvSpPr>
+        <p:spPr>
+          <a:xfrm>
+            <a:off x="751840" y="1173480"/>
+            <a:ext cx="254000" cy="132080"/>
+          </a:xfrm>
+          <a:prstGeom prst="rightArrow">
+            <a:avLst/>
+          </a:prstGeom>
+        </p:spPr>
+        <p:style>
+          <a:lnRef idx="2">
+            <a:schemeClr val="accent1">
+              <a:shade val="50000"/>
+            </a:schemeClr>
+          </a:lnRef>
+          <a:fillRef idx="1">
+            <a:schemeClr val="accent1"/>
+          </a:fillRef>
+          <a:effectRef idx="0">
+            <a:schemeClr val="accent1"/>
+          </a:effectRef>
+          <a:fontRef idx="minor">
+            <a:schemeClr val="lt1"/>
+          </a:fontRef>
+        </p:style>
+        <p:txBody>
+          <a:bodyPr rtlCol="0" anchor="ctr"/>
+          <a:lstStyle/>
+          <a:p>
+            <a:pPr algn="ctr"/>
+            <a:endParaRPr lang="bg-BG"/>
+          </a:p>
+        </p:txBody>
+      </p:sp>
+      <p:sp>
+        <p:nvSpPr>
+          <p:cNvPr id="7" name="Arrow: Right 6">
+            <a:extLst>
+              <a:ext uri="{FF2B5EF4-FFF2-40B4-BE49-F238E27FC236}">
+                <a16:creationId xmlns:a16="http://schemas.microsoft.com/office/drawing/2014/main" id="{574A595E-60C7-4AEA-A063-8774424871BA}"/>
+              </a:ext>
+            </a:extLst>
+          </p:cNvPr>
+          <p:cNvSpPr/>
+          <p:nvPr/>
+        </p:nvSpPr>
+        <p:spPr>
+          <a:xfrm>
+            <a:off x="751840" y="4556760"/>
+            <a:ext cx="254000" cy="132080"/>
+          </a:xfrm>
+          <a:prstGeom prst="rightArrow">
+            <a:avLst/>
+          </a:prstGeom>
+        </p:spPr>
+        <p:style>
+          <a:lnRef idx="2">
+            <a:schemeClr val="accent1">
+              <a:shade val="50000"/>
+            </a:schemeClr>
+          </a:lnRef>
+          <a:fillRef idx="1">
+            <a:schemeClr val="accent1"/>
+          </a:fillRef>
+          <a:effectRef idx="0">
+            <a:schemeClr val="accent1"/>
+          </a:effectRef>
+          <a:fontRef idx="minor">
+            <a:schemeClr val="lt1"/>
+          </a:fontRef>
+        </p:style>
+        <p:txBody>
+          <a:bodyPr rtlCol="0" anchor="ctr"/>
+          <a:lstStyle/>
+          <a:p>
+            <a:pPr algn="ctr"/>
+            <a:endParaRPr lang="bg-BG"/>
+          </a:p>
+        </p:txBody>
+      </p:sp>
     </p:spTree>
     <p:extLst>
       <p:ext uri="{BB962C8B-B14F-4D97-AF65-F5344CB8AC3E}">
@@ -25759,7 +26173,7 @@
         <p:spPr>
           <a:xfrm>
             <a:off x="995680" y="1968560"/>
-            <a:ext cx="8652173" cy="4093428"/>
+            <a:ext cx="8652173" cy="4247317"/>
           </a:xfrm>
           <a:prstGeom prst="rect">
             <a:avLst/>
@@ -25777,7 +26191,7 @@
               <a:buChar char="•"/>
             </a:pPr>
             <a:r>
-              <a:rPr lang="en-US" sz="3200" dirty="0"/>
+              <a:rPr lang="en-US" sz="3000" dirty="0"/>
               <a:t>Spring Boot</a:t>
             </a:r>
           </a:p>
@@ -25787,7 +26201,7 @@
               <a:buChar char="•"/>
             </a:pPr>
             <a:r>
-              <a:rPr lang="en-US" sz="3200" dirty="0"/>
+              <a:rPr lang="en-US" sz="3000" dirty="0"/>
               <a:t>Java EE</a:t>
             </a:r>
           </a:p>
@@ -25797,7 +26211,7 @@
               <a:buChar char="•"/>
             </a:pPr>
             <a:r>
-              <a:rPr lang="en-US" sz="3200" dirty="0"/>
+              <a:rPr lang="en-US" sz="3000" dirty="0"/>
               <a:t>MySQL Workbench</a:t>
             </a:r>
           </a:p>
@@ -25807,7 +26221,7 @@
               <a:buChar char="•"/>
             </a:pPr>
             <a:r>
-              <a:rPr lang="en-US" sz="3200" dirty="0"/>
+              <a:rPr lang="en-US" sz="3000" dirty="0"/>
               <a:t>Hibernate</a:t>
             </a:r>
           </a:p>
@@ -25817,7 +26231,7 @@
               <a:buChar char="•"/>
             </a:pPr>
             <a:r>
-              <a:rPr lang="en-US" sz="3200" dirty="0"/>
+              <a:rPr lang="en-US" sz="3000" dirty="0"/>
               <a:t>Postman</a:t>
             </a:r>
           </a:p>
@@ -25827,7 +26241,7 @@
               <a:buChar char="•"/>
             </a:pPr>
             <a:r>
-              <a:rPr lang="en-US" sz="3200" dirty="0"/>
+              <a:rPr lang="en-US" sz="3000" dirty="0"/>
               <a:t>Git</a:t>
             </a:r>
           </a:p>
@@ -25837,7 +26251,7 @@
               <a:buChar char="•"/>
             </a:pPr>
             <a:r>
-              <a:rPr lang="en-US" sz="3200" dirty="0"/>
+              <a:rPr lang="en-US" sz="3000" dirty="0"/>
               <a:t>GitHub</a:t>
             </a:r>
           </a:p>
@@ -25847,12 +26261,8 @@
               <a:buChar char="•"/>
             </a:pPr>
             <a:r>
-              <a:rPr lang="en-US" sz="3200" dirty="0" err="1"/>
-              <a:t>IDE:IntelliJ</a:t>
-            </a:r>
-            <a:r>
-              <a:rPr lang="en-US" sz="3200" dirty="0"/>
-              <a:t> Idea</a:t>
+              <a:rPr lang="en-US" sz="3000" dirty="0"/>
+              <a:t>IDE: IntelliJ Idea</a:t>
             </a:r>
           </a:p>
           <a:p>
@@ -25861,7 +26271,7 @@
               <a:buChar char="•"/>
             </a:pPr>
             <a:r>
-              <a:rPr lang="en-US" sz="3200" dirty="0"/>
+              <a:rPr lang="en-US" sz="3000" dirty="0"/>
               <a:t>Maven</a:t>
             </a:r>
           </a:p>
@@ -25871,9 +26281,13 @@
               <a:buChar char="•"/>
             </a:pPr>
             <a:r>
-              <a:rPr lang="en-US" sz="3200" dirty="0"/>
+              <a:rPr lang="en-US" sz="3000" dirty="0"/>
               <a:t>Tomcat</a:t>
             </a:r>
+            <a:endParaRPr lang="bg-BG" sz="3000" dirty="0"/>
+          </a:p>
+          <a:p>
+            <a:endParaRPr lang="en-US" sz="3000" dirty="0"/>
           </a:p>
           <a:p>
             <a:pPr marL="285750" indent="-285750">
@@ -25881,8 +26295,12 @@
               <a:buChar char="•"/>
             </a:pPr>
             <a:r>
-              <a:rPr lang="en-US" sz="3200" dirty="0"/>
-              <a:t>APIs and libraries:</a:t>
+              <a:rPr lang="en-US" sz="3000" i="1" dirty="0"/>
+              <a:t>APIs and libraries</a:t>
+            </a:r>
+            <a:r>
+              <a:rPr lang="en-US" sz="3000" dirty="0"/>
+              <a:t>:</a:t>
             </a:r>
           </a:p>
           <a:p>
@@ -25891,7 +26309,7 @@
               <a:buChar char="•"/>
             </a:pPr>
             <a:r>
-              <a:rPr lang="en-US" sz="3200" dirty="0"/>
+              <a:rPr lang="en-US" sz="3000" dirty="0"/>
               <a:t>Lombok</a:t>
             </a:r>
           </a:p>
@@ -25901,10 +26319,10 @@
               <a:buChar char="•"/>
             </a:pPr>
             <a:r>
-              <a:rPr lang="en-US" sz="3200" dirty="0" err="1"/>
+              <a:rPr lang="en-US" sz="3000" dirty="0" err="1"/>
               <a:t>BCrypt</a:t>
             </a:r>
-            <a:endParaRPr lang="en-US" sz="3200" dirty="0"/>
+            <a:endParaRPr lang="en-US" sz="3000" dirty="0"/>
           </a:p>
           <a:p>
             <a:pPr marL="285750" indent="-285750">
@@ -25912,7 +26330,7 @@
               <a:buChar char="•"/>
             </a:pPr>
             <a:r>
-              <a:rPr lang="en-US" sz="3200" dirty="0"/>
+              <a:rPr lang="en-US" sz="3000" dirty="0"/>
               <a:t>Spring Data JPA</a:t>
             </a:r>
           </a:p>
@@ -25922,10 +26340,10 @@
               <a:buChar char="•"/>
             </a:pPr>
             <a:r>
-              <a:rPr lang="en-US" sz="3200" dirty="0" err="1"/>
+              <a:rPr lang="en-US" sz="3000" dirty="0" err="1"/>
               <a:t>ModelMapper</a:t>
             </a:r>
-            <a:endParaRPr lang="en-US" sz="3200" dirty="0"/>
+            <a:endParaRPr lang="en-US" sz="3000" dirty="0"/>
           </a:p>
           <a:p>
             <a:pPr marL="285750" indent="-285750">
@@ -26123,6 +26541,14 @@
               <a:rPr lang="en-US" dirty="0"/>
               <a:t>Change password</a:t>
             </a:r>
+            <a:endParaRPr lang="bg-BG" dirty="0"/>
+          </a:p>
+          <a:p>
+            <a:r>
+              <a:rPr lang="en-US" dirty="0"/>
+              <a:t>Delete user photo</a:t>
+            </a:r>
+            <a:endParaRPr lang="bg-BG" dirty="0"/>
           </a:p>
           <a:p>
             <a:r>
@@ -26251,7 +26677,7 @@
         </p:blipFill>
         <p:spPr bwMode="auto">
           <a:xfrm>
-            <a:off x="6096000" y="3070116"/>
+            <a:off x="7294880" y="3070116"/>
             <a:ext cx="2933830" cy="2933830"/>
           </a:xfrm>
           <a:prstGeom prst="rect">
@@ -26350,43 +26776,43 @@
           <a:lstStyle/>
           <a:p>
             <a:r>
-              <a:rPr lang="en-US" sz="3600" dirty="0"/>
+              <a:rPr lang="en-US" sz="3000" dirty="0"/>
               <a:t>Make reservation</a:t>
             </a:r>
           </a:p>
           <a:p>
             <a:r>
-              <a:rPr lang="en-US" sz="3600" dirty="0"/>
+              <a:rPr lang="en-US" sz="3000" dirty="0"/>
               <a:t>Add payment</a:t>
             </a:r>
           </a:p>
           <a:p>
             <a:r>
-              <a:rPr lang="en-US" sz="3600" dirty="0"/>
+              <a:rPr lang="en-US" sz="3000" dirty="0"/>
               <a:t>Cancel reservation</a:t>
             </a:r>
           </a:p>
           <a:p>
             <a:r>
-              <a:rPr lang="en-US" sz="3600" dirty="0"/>
+              <a:rPr lang="en-US" sz="3000" dirty="0"/>
               <a:t>Get reservation by id</a:t>
             </a:r>
           </a:p>
           <a:p>
             <a:r>
-              <a:rPr lang="en-US" sz="3600" dirty="0"/>
+              <a:rPr lang="en-US" sz="3000" dirty="0"/>
               <a:t>Get payment by id</a:t>
             </a:r>
           </a:p>
           <a:p>
             <a:r>
-              <a:rPr lang="en-US" sz="3600" dirty="0"/>
+              <a:rPr lang="en-US" sz="3000" dirty="0"/>
               <a:t>Get payment status by id</a:t>
             </a:r>
           </a:p>
           <a:p>
             <a:r>
-              <a:rPr lang="en-US" sz="3600" dirty="0"/>
+              <a:rPr lang="en-US" sz="3000" dirty="0"/>
               <a:t>Confirm payment</a:t>
             </a:r>
           </a:p>
@@ -27022,10 +27448,10 @@
       </p:grpSpPr>
       <p:pic>
         <p:nvPicPr>
-          <p:cNvPr id="11" name="Picture 10">
+          <p:cNvPr id="10" name="Picture 9">
             <a:extLst>
               <a:ext uri="{FF2B5EF4-FFF2-40B4-BE49-F238E27FC236}">
-                <a16:creationId xmlns:a16="http://schemas.microsoft.com/office/drawing/2014/main" id="{F95BED02-CED5-4A3D-9015-DB7206B1BE39}"/>
+                <a16:creationId xmlns:a16="http://schemas.microsoft.com/office/drawing/2014/main" id="{766264F0-7B31-431A-BF1F-6D644BAE56EF}"/>
               </a:ext>
             </a:extLst>
           </p:cNvPr>
@@ -27034,14 +27460,15 @@
           </p:cNvPicPr>
           <p:nvPr/>
         </p:nvPicPr>
-        <p:blipFill rotWithShape="1">
+        <p:blipFill>
           <a:blip r:embed="rId2"/>
-          <a:srcRect l="6876" t="15374" r="41147" b="5324"/>
-          <a:stretch/>
+          <a:stretch>
+            <a:fillRect/>
+          </a:stretch>
         </p:blipFill>
         <p:spPr>
           <a:xfrm>
-            <a:off x="0" y="1"/>
+            <a:off x="0" y="0"/>
             <a:ext cx="12192000" cy="6858000"/>
           </a:xfrm>
           <a:prstGeom prst="rect">
@@ -27067,19 +27494,21 @@
         </p:nvSpPr>
         <p:spPr>
           <a:xfrm>
-            <a:off x="279919" y="4801394"/>
+            <a:off x="1448319" y="5693568"/>
             <a:ext cx="6055567" cy="1325563"/>
           </a:xfrm>
         </p:spPr>
         <p:txBody>
-          <a:bodyPr/>
+          <a:bodyPr>
+            <a:normAutofit/>
+          </a:bodyPr>
           <a:lstStyle/>
           <a:p>
             <a:r>
-              <a:rPr lang="en-US" dirty="0"/>
+              <a:rPr lang="en-US" sz="4000" dirty="0"/>
               <a:t>Diagram of the project</a:t>
             </a:r>
-            <a:endParaRPr lang="bg-BG" dirty="0"/>
+            <a:endParaRPr lang="bg-BG" sz="4000" dirty="0"/>
           </a:p>
         </p:txBody>
       </p:sp>
@@ -27134,7 +27563,7 @@
         </p:blipFill>
         <p:spPr>
           <a:xfrm>
-            <a:off x="10864849" y="5796015"/>
+            <a:off x="279919" y="315181"/>
             <a:ext cx="415862" cy="415862"/>
           </a:xfrm>
           <a:prstGeom prst="ellipse">
@@ -28029,21 +28458,21 @@
 </file>
 
 <file path=customXml/item1.xml><?xml version="1.0" encoding="utf-8"?>
+<p:properties xmlns:p="http://schemas.microsoft.com/office/2006/metadata/properties" xmlns:xsi="http://www.w3.org/2001/XMLSchema-instance" xmlns:pc="http://schemas.microsoft.com/office/infopath/2007/PartnerControls">
+  <documentManagement>
+    <_ip_UnifiedCompliancePolicyUIAction xmlns="http://schemas.microsoft.com/sharepoint/v3" xsi:nil="true"/>
+    <_ip_UnifiedCompliancePolicyProperties xmlns="http://schemas.microsoft.com/sharepoint/v3" xsi:nil="true"/>
+  </documentManagement>
+</p:properties>
+</file>
+
+<file path=customXml/item2.xml><?xml version="1.0" encoding="utf-8"?>
 <?mso-contentType ?>
 <FormTemplates xmlns="http://schemas.microsoft.com/sharepoint/v3/contenttype/forms">
   <Display>DocumentLibraryForm</Display>
   <Edit>DocumentLibraryForm</Edit>
   <New>DocumentLibraryForm</New>
 </FormTemplates>
-</file>
-
-<file path=customXml/item2.xml><?xml version="1.0" encoding="utf-8"?>
-<p:properties xmlns:p="http://schemas.microsoft.com/office/2006/metadata/properties" xmlns:xsi="http://www.w3.org/2001/XMLSchema-instance" xmlns:pc="http://schemas.microsoft.com/office/infopath/2007/PartnerControls">
-  <documentManagement>
-    <_ip_UnifiedCompliancePolicyUIAction xmlns="http://schemas.microsoft.com/sharepoint/v3" xsi:nil="true"/>
-    <_ip_UnifiedCompliancePolicyProperties xmlns="http://schemas.microsoft.com/sharepoint/v3" xsi:nil="true"/>
-  </documentManagement>
-</p:properties>
 </file>
 
 <file path=customXml/item3.xml><?xml version="1.0" encoding="utf-8"?>
@@ -28255,19 +28684,27 @@
 </file>
 
 <file path=customXml/itemProps1.xml><?xml version="1.0" encoding="utf-8"?>
-<ds:datastoreItem xmlns:ds="http://schemas.openxmlformats.org/officeDocument/2006/customXml" ds:itemID="{750F309C-DE10-4641-9043-BB7E781AC404}">
+<ds:datastoreItem xmlns:ds="http://schemas.openxmlformats.org/officeDocument/2006/customXml" ds:itemID="{12024DF7-0783-4549-86B7-A48B29FBA9C2}">
   <ds:schemaRefs>
-    <ds:schemaRef ds:uri="http://schemas.microsoft.com/sharepoint/v3/contenttype/forms"/>
+    <ds:schemaRef ds:uri="http://schemas.openxmlformats.org/package/2006/metadata/core-properties"/>
+    <ds:schemaRef ds:uri="http://schemas.microsoft.com/office/2006/documentManagement/types"/>
+    <ds:schemaRef ds:uri="http://www.w3.org/XML/1998/namespace"/>
+    <ds:schemaRef ds:uri="http://purl.org/dc/terms/"/>
+    <ds:schemaRef ds:uri="6dc4bcd6-49db-4c07-9060-8acfc67cef9f"/>
+    <ds:schemaRef ds:uri="http://schemas.microsoft.com/sharepoint/v3"/>
+    <ds:schemaRef ds:uri="http://purl.org/dc/dcmitype/"/>
+    <ds:schemaRef ds:uri="http://schemas.microsoft.com/office/2006/metadata/properties"/>
+    <ds:schemaRef ds:uri="http://schemas.microsoft.com/office/infopath/2007/PartnerControls"/>
+    <ds:schemaRef ds:uri="fb0879af-3eba-417a-a55a-ffe6dcd6ca77"/>
+    <ds:schemaRef ds:uri="http://purl.org/dc/elements/1.1/"/>
   </ds:schemaRefs>
 </ds:datastoreItem>
 </file>
 
 <file path=customXml/itemProps2.xml><?xml version="1.0" encoding="utf-8"?>
-<ds:datastoreItem xmlns:ds="http://schemas.openxmlformats.org/officeDocument/2006/customXml" ds:itemID="{12024DF7-0783-4549-86B7-A48B29FBA9C2}">
+<ds:datastoreItem xmlns:ds="http://schemas.openxmlformats.org/officeDocument/2006/customXml" ds:itemID="{750F309C-DE10-4641-9043-BB7E781AC404}">
   <ds:schemaRefs>
-    <ds:schemaRef ds:uri="http://schemas.microsoft.com/office/2006/metadata/properties"/>
-    <ds:schemaRef ds:uri="http://schemas.microsoft.com/office/infopath/2007/PartnerControls"/>
-    <ds:schemaRef ds:uri="http://schemas.microsoft.com/sharepoint/v3"/>
+    <ds:schemaRef ds:uri="http://schemas.microsoft.com/sharepoint/v3/contenttype/forms"/>
   </ds:schemaRefs>
 </ds:datastoreItem>
 </file>

</xml_diff>

<commit_message>
Presentation update and Property Photo methods modified
</commit_message>
<xml_diff>
--- a/Airbnb.pptx
+++ b/Airbnb.pptx
@@ -687,7 +687,7 @@
           <a:p>
             <a:fld id="{F702A5B2-8064-4382-9E31-9E46E0F5B2C3}" type="datetimeFigureOut">
               <a:rPr lang="ru-RU" smtClean="0"/>
-              <a:t>25.02.2022</a:t>
+              <a:t>27.02.2022</a:t>
             </a:fld>
             <a:endParaRPr lang="ru-RU"/>
           </a:p>
@@ -864,7 +864,7 @@
           <a:p>
             <a:fld id="{7000EB3D-2307-4317-8A1D-B47FA45245F0}" type="datetimeFigureOut">
               <a:rPr lang="ru-RU" smtClean="0"/>
-              <a:t>25.02.2022</a:t>
+              <a:t>27.02.2022</a:t>
             </a:fld>
             <a:endParaRPr lang="ru-RU" dirty="0"/>
           </a:p>
@@ -1263,7 +1263,7 @@
           <a:p>
             <a:fld id="{84CB0007-981E-43F8-9CC7-CA45D8EE9D06}" type="datetimeFigureOut">
               <a:rPr lang="bg-BG" smtClean="0"/>
-              <a:t>25.2.2022 г.</a:t>
+              <a:t>27.2.2022 г.</a:t>
             </a:fld>
             <a:endParaRPr lang="bg-BG"/>
           </a:p>
@@ -24646,8 +24646,8 @@
         </p:blipFill>
         <p:spPr>
           <a:xfrm>
-            <a:off x="5151697" y="792450"/>
-            <a:ext cx="2254366" cy="1168460"/>
+            <a:off x="5090160" y="792449"/>
+            <a:ext cx="2340083" cy="1212888"/>
           </a:xfrm>
           <a:prstGeom prst="rect">
             <a:avLst/>
@@ -24676,8 +24676,8 @@
         </p:blipFill>
         <p:spPr>
           <a:xfrm>
-            <a:off x="7674478" y="759495"/>
-            <a:ext cx="1886047" cy="749339"/>
+            <a:off x="7412348" y="792449"/>
+            <a:ext cx="2173636" cy="863600"/>
           </a:xfrm>
           <a:prstGeom prst="rect">
             <a:avLst/>
@@ -24706,7 +24706,7 @@
         </p:blipFill>
         <p:spPr>
           <a:xfrm>
-            <a:off x="9346822" y="1567980"/>
+            <a:off x="9456786" y="1305355"/>
             <a:ext cx="2114659" cy="3988005"/>
           </a:xfrm>
           <a:prstGeom prst="rect">
@@ -24736,8 +24736,8 @@
         </p:blipFill>
         <p:spPr>
           <a:xfrm>
-            <a:off x="5387938" y="2482801"/>
-            <a:ext cx="1416123" cy="1892397"/>
+            <a:off x="5387937" y="2482800"/>
+            <a:ext cx="1715453" cy="2292399"/>
           </a:xfrm>
           <a:prstGeom prst="rect">
             <a:avLst/>
@@ -24767,7 +24767,7 @@
         <p:spPr>
           <a:xfrm>
             <a:off x="7430244" y="4027211"/>
-            <a:ext cx="1892397" cy="1543129"/>
+            <a:ext cx="2051966" cy="1673247"/>
           </a:xfrm>
           <a:prstGeom prst="rect">
             <a:avLst/>
@@ -24776,10 +24776,10 @@
       </p:pic>
       <p:pic>
         <p:nvPicPr>
-          <p:cNvPr id="19" name="Picture 18">
+          <p:cNvPr id="5" name="Picture 4">
             <a:extLst>
               <a:ext uri="{FF2B5EF4-FFF2-40B4-BE49-F238E27FC236}">
-                <a16:creationId xmlns:a16="http://schemas.microsoft.com/office/drawing/2014/main" id="{5D717792-1D61-47B5-A1CE-219D21E7A71F}"/>
+                <a16:creationId xmlns:a16="http://schemas.microsoft.com/office/drawing/2014/main" id="{AB3DB200-56C1-4C48-A13B-E488D25E903B}"/>
               </a:ext>
             </a:extLst>
           </p:cNvPr>
@@ -24796,8 +24796,8 @@
         </p:blipFill>
         <p:spPr>
           <a:xfrm>
-            <a:off x="7306876" y="2440970"/>
-            <a:ext cx="1663786" cy="1168460"/>
+            <a:off x="7406063" y="2377544"/>
+            <a:ext cx="2030398" cy="1051456"/>
           </a:xfrm>
           <a:prstGeom prst="rect">
             <a:avLst/>
@@ -24806,10 +24806,10 @@
       </p:pic>
       <p:pic>
         <p:nvPicPr>
-          <p:cNvPr id="23" name="Picture 22">
+          <p:cNvPr id="9" name="Picture 8">
             <a:extLst>
               <a:ext uri="{FF2B5EF4-FFF2-40B4-BE49-F238E27FC236}">
-                <a16:creationId xmlns:a16="http://schemas.microsoft.com/office/drawing/2014/main" id="{0A3D4E80-BD8D-4023-B8B1-9BE697F58653}"/>
+                <a16:creationId xmlns:a16="http://schemas.microsoft.com/office/drawing/2014/main" id="{659E450B-5CEB-4DAC-925F-38F3056573A1}"/>
               </a:ext>
             </a:extLst>
           </p:cNvPr>
@@ -24826,8 +24826,8 @@
         </p:blipFill>
         <p:spPr>
           <a:xfrm>
-            <a:off x="5493587" y="4917455"/>
-            <a:ext cx="1587582" cy="406421"/>
+            <a:off x="5341009" y="4945519"/>
+            <a:ext cx="1994624" cy="429033"/>
           </a:xfrm>
           <a:prstGeom prst="rect">
             <a:avLst/>
@@ -24939,7 +24939,7 @@
         <p:spPr>
           <a:xfrm>
             <a:off x="956076" y="2466079"/>
-            <a:ext cx="10397724" cy="1169551"/>
+            <a:ext cx="10397724" cy="1092607"/>
           </a:xfrm>
           <a:prstGeom prst="rect">
             <a:avLst/>
@@ -24953,10 +24953,10 @@
           <a:lstStyle/>
           <a:p>
             <a:r>
-              <a:rPr lang="en-US" sz="7000" dirty="0"/>
+              <a:rPr lang="en-US" sz="6500" dirty="0"/>
               <a:t>Time to see our Demo! </a:t>
             </a:r>
-            <a:endParaRPr lang="bg-BG" sz="7000" dirty="0"/>
+            <a:endParaRPr lang="bg-BG" sz="6500" dirty="0"/>
           </a:p>
         </p:txBody>
       </p:sp>
@@ -25681,8 +25681,8 @@
         </p:nvSpPr>
         <p:spPr>
           <a:xfrm>
-            <a:off x="637489" y="935674"/>
-            <a:ext cx="8465872" cy="4401205"/>
+            <a:off x="1005840" y="1738314"/>
+            <a:ext cx="8465872" cy="2246769"/>
           </a:xfrm>
           <a:prstGeom prst="rect">
             <a:avLst/>
@@ -25731,122 +25731,7 @@
               <a:rPr lang="ru-RU" sz="2800" dirty="0"/>
               <a:t> свят. </a:t>
             </a:r>
-            <a:r>
-              <a:rPr lang="ru-RU" sz="2800" dirty="0" err="1"/>
-              <a:t>Всеки</a:t>
-            </a:r>
-            <a:r>
-              <a:rPr lang="ru-RU" sz="2800" dirty="0"/>
-              <a:t> може да </a:t>
-            </a:r>
-            <a:r>
-              <a:rPr lang="ru-RU" sz="2800" dirty="0" err="1"/>
-              <a:t>пусне</a:t>
-            </a:r>
-            <a:r>
-              <a:rPr lang="ru-RU" sz="2800" dirty="0"/>
-              <a:t> </a:t>
-            </a:r>
-            <a:r>
-              <a:rPr lang="ru-RU" sz="2800" dirty="0" err="1"/>
-              <a:t>обява</a:t>
-            </a:r>
-            <a:r>
-              <a:rPr lang="ru-RU" sz="2800" dirty="0"/>
-              <a:t> за стая, апартамент, вила или </a:t>
-            </a:r>
-            <a:r>
-              <a:rPr lang="ru-RU" sz="2800" dirty="0" err="1"/>
-              <a:t>цяла</a:t>
-            </a:r>
-            <a:r>
-              <a:rPr lang="ru-RU" sz="2800" dirty="0"/>
-              <a:t> </a:t>
-            </a:r>
-            <a:r>
-              <a:rPr lang="ru-RU" sz="2800" dirty="0" err="1"/>
-              <a:t>къща</a:t>
-            </a:r>
-            <a:r>
-              <a:rPr lang="en-US" sz="2800" dirty="0"/>
-              <a:t>. </a:t>
-            </a:r>
-            <a:r>
-              <a:rPr lang="bg-BG" sz="2800" dirty="0"/>
-              <a:t>Р</a:t>
-            </a:r>
-            <a:r>
-              <a:rPr lang="ru-RU" sz="2800" dirty="0" err="1"/>
-              <a:t>олята</a:t>
-            </a:r>
-            <a:r>
-              <a:rPr lang="ru-RU" sz="2800" dirty="0"/>
-              <a:t> на </a:t>
-            </a:r>
-            <a:r>
-              <a:rPr lang="ru-RU" sz="2800" dirty="0" err="1"/>
-              <a:t>платформата</a:t>
-            </a:r>
-            <a:r>
-              <a:rPr lang="ru-RU" sz="2800" dirty="0"/>
-              <a:t> е да </a:t>
-            </a:r>
-            <a:r>
-              <a:rPr lang="ru-RU" sz="2800" dirty="0" err="1"/>
-              <a:t>свързва</a:t>
-            </a:r>
-            <a:r>
-              <a:rPr lang="ru-RU" sz="2800" dirty="0"/>
-              <a:t> </a:t>
-            </a:r>
-            <a:r>
-              <a:rPr lang="ru-RU" sz="2800" dirty="0" err="1"/>
-              <a:t>собствениците</a:t>
-            </a:r>
-            <a:r>
-              <a:rPr lang="ru-RU" sz="2800" dirty="0"/>
-              <a:t> и гостите, да предлага </a:t>
-            </a:r>
-            <a:r>
-              <a:rPr lang="ru-RU" sz="2800" dirty="0" err="1"/>
-              <a:t>необходимата</a:t>
-            </a:r>
-            <a:r>
-              <a:rPr lang="ru-RU" sz="2800" dirty="0"/>
-              <a:t> информация и да </a:t>
-            </a:r>
-            <a:r>
-              <a:rPr lang="ru-RU" sz="2800" dirty="0" err="1"/>
-              <a:t>осигурява</a:t>
-            </a:r>
-            <a:r>
-              <a:rPr lang="ru-RU" sz="2800" dirty="0"/>
-              <a:t> </a:t>
-            </a:r>
-            <a:r>
-              <a:rPr lang="ru-RU" sz="2800" dirty="0" err="1"/>
-              <a:t>обработването</a:t>
-            </a:r>
-            <a:r>
-              <a:rPr lang="ru-RU" sz="2800" dirty="0"/>
-              <a:t> на </a:t>
-            </a:r>
-            <a:r>
-              <a:rPr lang="ru-RU" sz="2800" dirty="0" err="1"/>
-              <a:t>плащането</a:t>
-            </a:r>
-            <a:r>
-              <a:rPr lang="ru-RU" sz="2800" dirty="0"/>
-              <a:t> за </a:t>
-            </a:r>
-            <a:r>
-              <a:rPr lang="ru-RU" sz="2800" dirty="0" err="1"/>
-              <a:t>престоя</a:t>
-            </a:r>
-            <a:r>
-              <a:rPr lang="ru-RU" sz="2800" dirty="0"/>
-              <a:t>.</a:t>
-            </a:r>
+            <a:endParaRPr lang="en-US" sz="2800" dirty="0"/>
           </a:p>
           <a:p>
             <a:endParaRPr lang="ru-RU" sz="2800" dirty="0"/>
@@ -25990,7 +25875,7 @@
         </p:nvSpPr>
         <p:spPr>
           <a:xfrm>
-            <a:off x="751840" y="1173480"/>
+            <a:off x="1188720" y="1925320"/>
             <a:ext cx="254000" cy="132080"/>
           </a:xfrm>
           <a:prstGeom prst="rightArrow">
@@ -26024,10 +25909,10 @@
       </p:sp>
       <p:sp>
         <p:nvSpPr>
-          <p:cNvPr id="7" name="Arrow: Right 6">
+          <p:cNvPr id="8" name="Arrow: Right 7">
             <a:extLst>
               <a:ext uri="{FF2B5EF4-FFF2-40B4-BE49-F238E27FC236}">
-                <a16:creationId xmlns:a16="http://schemas.microsoft.com/office/drawing/2014/main" id="{574A595E-60C7-4AEA-A063-8774424871BA}"/>
+                <a16:creationId xmlns:a16="http://schemas.microsoft.com/office/drawing/2014/main" id="{0077CAF5-E240-4A8C-9D68-D00C83A7F317}"/>
               </a:ext>
             </a:extLst>
           </p:cNvPr>
@@ -26036,7 +25921,7 @@
         </p:nvSpPr>
         <p:spPr>
           <a:xfrm>
-            <a:off x="751840" y="4556760"/>
+            <a:off x="1173480" y="3189146"/>
             <a:ext cx="254000" cy="132080"/>
           </a:xfrm>
           <a:prstGeom prst="rightArrow">
@@ -26290,13 +26175,9 @@
             <a:endParaRPr lang="en-US" sz="3000" dirty="0"/>
           </a:p>
           <a:p>
-            <a:pPr marL="285750" indent="-285750">
-              <a:buFont typeface="Arial" panose="020B0604020202020204" pitchFamily="34" charset="0"/>
-              <a:buChar char="•"/>
-            </a:pPr>
             <a:r>
               <a:rPr lang="en-US" sz="3000" i="1" dirty="0"/>
-              <a:t>APIs and libraries</a:t>
+              <a:t>   APIs and libraries</a:t>
             </a:r>
             <a:r>
               <a:rPr lang="en-US" sz="3000" dirty="0"/>
@@ -26413,6 +26294,52 @@
           </a:sp3d>
         </p:spPr>
       </p:pic>
+      <p:sp>
+        <p:nvSpPr>
+          <p:cNvPr id="7" name="Arrow: Right 6">
+            <a:extLst>
+              <a:ext uri="{FF2B5EF4-FFF2-40B4-BE49-F238E27FC236}">
+                <a16:creationId xmlns:a16="http://schemas.microsoft.com/office/drawing/2014/main" id="{01D17115-5BC6-4B4B-B5E8-070BA8B67F59}"/>
+              </a:ext>
+            </a:extLst>
+          </p:cNvPr>
+          <p:cNvSpPr/>
+          <p:nvPr/>
+        </p:nvSpPr>
+        <p:spPr>
+          <a:xfrm>
+            <a:off x="5194766" y="3073400"/>
+            <a:ext cx="254000" cy="132080"/>
+          </a:xfrm>
+          <a:prstGeom prst="rightArrow">
+            <a:avLst/>
+          </a:prstGeom>
+        </p:spPr>
+        <p:style>
+          <a:lnRef idx="2">
+            <a:schemeClr val="accent1">
+              <a:shade val="50000"/>
+            </a:schemeClr>
+          </a:lnRef>
+          <a:fillRef idx="1">
+            <a:schemeClr val="accent1"/>
+          </a:fillRef>
+          <a:effectRef idx="0">
+            <a:schemeClr val="accent1"/>
+          </a:effectRef>
+          <a:fontRef idx="minor">
+            <a:schemeClr val="lt1"/>
+          </a:fontRef>
+        </p:style>
+        <p:txBody>
+          <a:bodyPr rtlCol="0" anchor="ctr"/>
+          <a:lstStyle/>
+          <a:p>
+            <a:pPr algn="ctr"/>
+            <a:endParaRPr lang="bg-BG"/>
+          </a:p>
+        </p:txBody>
+      </p:sp>
     </p:spTree>
     <p:extLst>
       <p:ext uri="{BB962C8B-B14F-4D97-AF65-F5344CB8AC3E}">
@@ -26521,13 +26448,7 @@
           <a:p>
             <a:r>
               <a:rPr lang="en-US" dirty="0"/>
-              <a:t>Add user photo</a:t>
-            </a:r>
-          </a:p>
-          <a:p>
-            <a:r>
-              <a:rPr lang="en-US" dirty="0"/>
-              <a:t>Delete user photo</a:t>
+              <a:t>Get user by id</a:t>
             </a:r>
           </a:p>
           <a:p>
@@ -26540,6 +26461,12 @@
             <a:r>
               <a:rPr lang="en-US" dirty="0"/>
               <a:t>Change password</a:t>
+            </a:r>
+          </a:p>
+          <a:p>
+            <a:r>
+              <a:rPr lang="en-US" dirty="0"/>
+              <a:t>Add user photo</a:t>
             </a:r>
             <a:endParaRPr lang="bg-BG" dirty="0"/>
           </a:p>
@@ -27047,6 +26974,12 @@
           <a:p>
             <a:r>
               <a:rPr lang="en-US" dirty="0"/>
+              <a:t>Add rating</a:t>
+            </a:r>
+          </a:p>
+          <a:p>
+            <a:r>
+              <a:rPr lang="en-US" dirty="0"/>
               <a:t>Filter by price</a:t>
             </a:r>
           </a:p>
@@ -27060,13 +26993,6 @@
             <a:r>
               <a:rPr lang="en-US" dirty="0"/>
               <a:t>Edit address</a:t>
-            </a:r>
-          </a:p>
-          <a:p>
-            <a:pPr algn="just"/>
-            <a:r>
-              <a:rPr lang="en-US" dirty="0"/>
-              <a:t>Add rating</a:t>
             </a:r>
           </a:p>
           <a:p>
@@ -27448,10 +27374,10 @@
       </p:grpSpPr>
       <p:pic>
         <p:nvPicPr>
-          <p:cNvPr id="6" name="Picture 5">
+          <p:cNvPr id="7" name="Picture 6">
             <a:extLst>
               <a:ext uri="{FF2B5EF4-FFF2-40B4-BE49-F238E27FC236}">
-                <a16:creationId xmlns:a16="http://schemas.microsoft.com/office/drawing/2014/main" id="{3006EA29-7E4D-4CC5-9647-F0A5EF7D4F3C}"/>
+                <a16:creationId xmlns:a16="http://schemas.microsoft.com/office/drawing/2014/main" id="{73238339-15D3-463E-9BF2-FCCE5805C1AC}"/>
               </a:ext>
             </a:extLst>
           </p:cNvPr>
@@ -27468,8 +27394,8 @@
         </p:blipFill>
         <p:spPr>
           <a:xfrm>
-            <a:off x="0" y="1"/>
-            <a:ext cx="12192000" cy="6858000"/>
+            <a:off x="40640" y="-1378"/>
+            <a:ext cx="12161520" cy="6859378"/>
           </a:xfrm>
           <a:prstGeom prst="rect">
             <a:avLst/>
@@ -27494,7 +27420,7 @@
         </p:nvSpPr>
         <p:spPr>
           <a:xfrm>
-            <a:off x="3068216" y="5876130"/>
+            <a:off x="1292757" y="5693568"/>
             <a:ext cx="6055567" cy="1325563"/>
           </a:xfrm>
         </p:spPr>
@@ -27505,10 +27431,10 @@
           <a:lstStyle/>
           <a:p>
             <a:r>
-              <a:rPr lang="en-US" sz="4000" dirty="0"/>
+              <a:rPr lang="en-US" sz="3500" dirty="0"/>
               <a:t>Diagram of the project</a:t>
             </a:r>
-            <a:endParaRPr lang="bg-BG" sz="4000" dirty="0"/>
+            <a:endParaRPr lang="bg-BG" sz="3500" dirty="0"/>
           </a:p>
         </p:txBody>
       </p:sp>
@@ -28458,21 +28384,21 @@
 </file>
 
 <file path=customXml/item1.xml><?xml version="1.0" encoding="utf-8"?>
+<p:properties xmlns:p="http://schemas.microsoft.com/office/2006/metadata/properties" xmlns:xsi="http://www.w3.org/2001/XMLSchema-instance" xmlns:pc="http://schemas.microsoft.com/office/infopath/2007/PartnerControls">
+  <documentManagement>
+    <_ip_UnifiedCompliancePolicyUIAction xmlns="http://schemas.microsoft.com/sharepoint/v3" xsi:nil="true"/>
+    <_ip_UnifiedCompliancePolicyProperties xmlns="http://schemas.microsoft.com/sharepoint/v3" xsi:nil="true"/>
+  </documentManagement>
+</p:properties>
+</file>
+
+<file path=customXml/item2.xml><?xml version="1.0" encoding="utf-8"?>
 <?mso-contentType ?>
 <FormTemplates xmlns="http://schemas.microsoft.com/sharepoint/v3/contenttype/forms">
   <Display>DocumentLibraryForm</Display>
   <Edit>DocumentLibraryForm</Edit>
   <New>DocumentLibraryForm</New>
 </FormTemplates>
-</file>
-
-<file path=customXml/item2.xml><?xml version="1.0" encoding="utf-8"?>
-<p:properties xmlns:p="http://schemas.microsoft.com/office/2006/metadata/properties" xmlns:xsi="http://www.w3.org/2001/XMLSchema-instance" xmlns:pc="http://schemas.microsoft.com/office/infopath/2007/PartnerControls">
-  <documentManagement>
-    <_ip_UnifiedCompliancePolicyUIAction xmlns="http://schemas.microsoft.com/sharepoint/v3" xsi:nil="true"/>
-    <_ip_UnifiedCompliancePolicyProperties xmlns="http://schemas.microsoft.com/sharepoint/v3" xsi:nil="true"/>
-  </documentManagement>
-</p:properties>
 </file>
 
 <file path=customXml/item3.xml><?xml version="1.0" encoding="utf-8"?>
@@ -28684,14 +28610,6 @@
 </file>
 
 <file path=customXml/itemProps1.xml><?xml version="1.0" encoding="utf-8"?>
-<ds:datastoreItem xmlns:ds="http://schemas.openxmlformats.org/officeDocument/2006/customXml" ds:itemID="{750F309C-DE10-4641-9043-BB7E781AC404}">
-  <ds:schemaRefs>
-    <ds:schemaRef ds:uri="http://schemas.microsoft.com/sharepoint/v3/contenttype/forms"/>
-  </ds:schemaRefs>
-</ds:datastoreItem>
-</file>
-
-<file path=customXml/itemProps2.xml><?xml version="1.0" encoding="utf-8"?>
 <ds:datastoreItem xmlns:ds="http://schemas.openxmlformats.org/officeDocument/2006/customXml" ds:itemID="{12024DF7-0783-4549-86B7-A48B29FBA9C2}">
   <ds:schemaRefs>
     <ds:schemaRef ds:uri="http://schemas.openxmlformats.org/package/2006/metadata/core-properties"/>
@@ -28705,6 +28623,14 @@
     <ds:schemaRef ds:uri="http://schemas.microsoft.com/office/infopath/2007/PartnerControls"/>
     <ds:schemaRef ds:uri="fb0879af-3eba-417a-a55a-ffe6dcd6ca77"/>
     <ds:schemaRef ds:uri="http://purl.org/dc/elements/1.1/"/>
+  </ds:schemaRefs>
+</ds:datastoreItem>
+</file>
+
+<file path=customXml/itemProps2.xml><?xml version="1.0" encoding="utf-8"?>
+<ds:datastoreItem xmlns:ds="http://schemas.openxmlformats.org/officeDocument/2006/customXml" ds:itemID="{750F309C-DE10-4641-9043-BB7E781AC404}">
+  <ds:schemaRefs>
+    <ds:schemaRef ds:uri="http://schemas.microsoft.com/sharepoint/v3/contenttype/forms"/>
   </ds:schemaRefs>
 </ds:datastoreItem>
 </file>

</xml_diff>

<commit_message>
DB and Presentation update. Photos added
</commit_message>
<xml_diff>
--- a/Airbnb.pptx
+++ b/Airbnb.pptx
@@ -687,7 +687,7 @@
           <a:p>
             <a:fld id="{F702A5B2-8064-4382-9E31-9E46E0F5B2C3}" type="datetimeFigureOut">
               <a:rPr lang="ru-RU" smtClean="0"/>
-              <a:t>27.02.2022</a:t>
+              <a:t>28.02.2022</a:t>
             </a:fld>
             <a:endParaRPr lang="ru-RU"/>
           </a:p>
@@ -864,7 +864,7 @@
           <a:p>
             <a:fld id="{7000EB3D-2307-4317-8A1D-B47FA45245F0}" type="datetimeFigureOut">
               <a:rPr lang="ru-RU" smtClean="0"/>
-              <a:t>27.02.2022</a:t>
+              <a:t>28.02.2022</a:t>
             </a:fld>
             <a:endParaRPr lang="ru-RU" dirty="0"/>
           </a:p>
@@ -1263,7 +1263,7 @@
           <a:p>
             <a:fld id="{84CB0007-981E-43F8-9CC7-CA45D8EE9D06}" type="datetimeFigureOut">
               <a:rPr lang="bg-BG" smtClean="0"/>
-              <a:t>27.2.2022 г.</a:t>
+              <a:t>28.2.2022 г.</a:t>
             </a:fld>
             <a:endParaRPr lang="bg-BG"/>
           </a:p>
@@ -26475,6 +26475,12 @@
               <a:rPr lang="en-US" dirty="0"/>
               <a:t>Delete user photo</a:t>
             </a:r>
+          </a:p>
+          <a:p>
+            <a:r>
+              <a:rPr lang="en-US" dirty="0"/>
+              <a:t>Download user photo</a:t>
+            </a:r>
             <a:endParaRPr lang="bg-BG" dirty="0"/>
           </a:p>
           <a:p>
@@ -26968,6 +26974,12 @@
           <a:p>
             <a:r>
               <a:rPr lang="en-US" dirty="0"/>
+              <a:t>Download property photo(s)</a:t>
+            </a:r>
+          </a:p>
+          <a:p>
+            <a:r>
+              <a:rPr lang="en-US" dirty="0"/>
               <a:t>Get property by id</a:t>
             </a:r>
           </a:p>
@@ -27114,8 +27126,8 @@
         </p:blipFill>
         <p:spPr bwMode="auto">
           <a:xfrm>
-            <a:off x="6096000" y="3126849"/>
-            <a:ext cx="3327043" cy="3139807"/>
+            <a:off x="6655157" y="3429000"/>
+            <a:ext cx="3327043" cy="2837656"/>
           </a:xfrm>
           <a:prstGeom prst="rect">
             <a:avLst/>
@@ -28384,21 +28396,21 @@
 </file>
 
 <file path=customXml/item1.xml><?xml version="1.0" encoding="utf-8"?>
+<?mso-contentType ?>
+<FormTemplates xmlns="http://schemas.microsoft.com/sharepoint/v3/contenttype/forms">
+  <Display>DocumentLibraryForm</Display>
+  <Edit>DocumentLibraryForm</Edit>
+  <New>DocumentLibraryForm</New>
+</FormTemplates>
+</file>
+
+<file path=customXml/item2.xml><?xml version="1.0" encoding="utf-8"?>
 <p:properties xmlns:p="http://schemas.microsoft.com/office/2006/metadata/properties" xmlns:xsi="http://www.w3.org/2001/XMLSchema-instance" xmlns:pc="http://schemas.microsoft.com/office/infopath/2007/PartnerControls">
   <documentManagement>
     <_ip_UnifiedCompliancePolicyUIAction xmlns="http://schemas.microsoft.com/sharepoint/v3" xsi:nil="true"/>
     <_ip_UnifiedCompliancePolicyProperties xmlns="http://schemas.microsoft.com/sharepoint/v3" xsi:nil="true"/>
   </documentManagement>
 </p:properties>
-</file>
-
-<file path=customXml/item2.xml><?xml version="1.0" encoding="utf-8"?>
-<?mso-contentType ?>
-<FormTemplates xmlns="http://schemas.microsoft.com/sharepoint/v3/contenttype/forms">
-  <Display>DocumentLibraryForm</Display>
-  <Edit>DocumentLibraryForm</Edit>
-  <New>DocumentLibraryForm</New>
-</FormTemplates>
 </file>
 
 <file path=customXml/item3.xml><?xml version="1.0" encoding="utf-8"?>
@@ -28610,6 +28622,14 @@
 </file>
 
 <file path=customXml/itemProps1.xml><?xml version="1.0" encoding="utf-8"?>
+<ds:datastoreItem xmlns:ds="http://schemas.openxmlformats.org/officeDocument/2006/customXml" ds:itemID="{750F309C-DE10-4641-9043-BB7E781AC404}">
+  <ds:schemaRefs>
+    <ds:schemaRef ds:uri="http://schemas.microsoft.com/sharepoint/v3/contenttype/forms"/>
+  </ds:schemaRefs>
+</ds:datastoreItem>
+</file>
+
+<file path=customXml/itemProps2.xml><?xml version="1.0" encoding="utf-8"?>
 <ds:datastoreItem xmlns:ds="http://schemas.openxmlformats.org/officeDocument/2006/customXml" ds:itemID="{12024DF7-0783-4549-86B7-A48B29FBA9C2}">
   <ds:schemaRefs>
     <ds:schemaRef ds:uri="http://schemas.openxmlformats.org/package/2006/metadata/core-properties"/>
@@ -28623,14 +28643,6 @@
     <ds:schemaRef ds:uri="http://schemas.microsoft.com/office/infopath/2007/PartnerControls"/>
     <ds:schemaRef ds:uri="fb0879af-3eba-417a-a55a-ffe6dcd6ca77"/>
     <ds:schemaRef ds:uri="http://purl.org/dc/elements/1.1/"/>
-  </ds:schemaRefs>
-</ds:datastoreItem>
-</file>
-
-<file path=customXml/itemProps2.xml><?xml version="1.0" encoding="utf-8"?>
-<ds:datastoreItem xmlns:ds="http://schemas.openxmlformats.org/officeDocument/2006/customXml" ds:itemID="{750F309C-DE10-4641-9043-BB7E781AC404}">
-  <ds:schemaRefs>
-    <ds:schemaRef ds:uri="http://schemas.microsoft.com/sharepoint/v3/contenttype/forms"/>
   </ds:schemaRefs>
 </ds:datastoreItem>
 </file>

</xml_diff>